<commit_message>
Tweak maui slides for vslive orlando 2025
</commit_message>
<xml_diff>
--- a/2025/1116_VSLiveOrlando/Maui Toolkit/Create Multi-Platform Apps with .NET.pptx
+++ b/2025/1116_VSLiveOrlando/Maui Toolkit/Create Multi-Platform Apps with .NET.pptx
@@ -442,7 +442,7 @@
               <a:pPr>
                 <a:defRPr/>
               </a:pPr>
-              <a:t>10/11/2025</a:t>
+              <a:t>11/9/2025</a:t>
             </a:fld>
             <a:endParaRPr lang="en-US"/>
           </a:p>
@@ -838,7 +838,18 @@
                 <a:spcPct val="0"/>
               </a:spcBef>
             </a:pPr>
-            <a:endParaRPr lang="en-US" dirty="0"/>
+            <a:r>
+              <a:rPr lang="en-US" dirty="0"/>
+              <a:t>Welcome, folks! I hope you’re having a great week at Live! 360 and </a:t>
+            </a:r>
+            <a:r>
+              <a:rPr lang="en-US" dirty="0" err="1"/>
+              <a:t>VSLive</a:t>
+            </a:r>
+            <a:r>
+              <a:rPr lang="en-US" dirty="0"/>
+              <a:t>! In this session, we’ll be looking at .NET MAUI and the Community Toolkits.</a:t>
+            </a:r>
           </a:p>
         </p:txBody>
       </p:sp>
@@ -952,7 +963,7 @@
           <a:p>
             <a:r>
               <a:rPr lang="en-US" dirty="0"/>
-              <a:t>Learn how to leverage debugging tools, simulators, and emulators to test applications on different platforms directly from your development environment.</a:t>
+              <a:t>Visual Studio on Windows and macOS are primary IDEs, complemented by VS Code and command-line tools that support .NET MAUI development workflows.</a:t>
             </a:r>
           </a:p>
         </p:txBody>
@@ -980,7 +991,7 @@
               <a:pPr>
                 <a:defRPr/>
               </a:pPr>
-              <a:t>11</a:t>
+              <a:t>10</a:t>
             </a:fld>
             <a:endParaRPr lang="en-US"/>
           </a:p>
@@ -989,7 +1000,7 @@
     </p:spTree>
     <p:extLst>
       <p:ext uri="{BB962C8B-B14F-4D97-AF65-F5344CB8AC3E}">
-        <p14:creationId xmlns:p14="http://schemas.microsoft.com/office/powerpoint/2010/main" val="1395849180"/>
+        <p14:creationId xmlns:p14="http://schemas.microsoft.com/office/powerpoint/2010/main" val="3368702723"/>
       </p:ext>
     </p:extLst>
   </p:cSld>
@@ -1045,6 +1056,99 @@
           <a:p>
             <a:r>
               <a:rPr lang="en-US" dirty="0"/>
+              <a:t>Learn how to leverage debugging tools, simulators, and emulators to test applications on different platforms directly from your development environment.</a:t>
+            </a:r>
+          </a:p>
+        </p:txBody>
+      </p:sp>
+      <p:sp>
+        <p:nvSpPr>
+          <p:cNvPr id="4" name="Slide Number Placeholder 3"/>
+          <p:cNvSpPr>
+            <a:spLocks noGrp="1"/>
+          </p:cNvSpPr>
+          <p:nvPr>
+            <p:ph type="sldNum" sz="quarter" idx="5"/>
+          </p:nvPr>
+        </p:nvSpPr>
+        <p:spPr/>
+        <p:txBody>
+          <a:bodyPr/>
+          <a:lstStyle/>
+          <a:p>
+            <a:pPr>
+              <a:defRPr/>
+            </a:pPr>
+            <a:fld id="{7BE5AA1C-3A4A-4E86-88DD-FDD0A0056FE6}" type="slidenum">
+              <a:rPr lang="en-US" smtClean="0"/>
+              <a:pPr>
+                <a:defRPr/>
+              </a:pPr>
+              <a:t>11</a:t>
+            </a:fld>
+            <a:endParaRPr lang="en-US"/>
+          </a:p>
+        </p:txBody>
+      </p:sp>
+    </p:spTree>
+    <p:extLst>
+      <p:ext uri="{BB962C8B-B14F-4D97-AF65-F5344CB8AC3E}">
+        <p14:creationId xmlns:p14="http://schemas.microsoft.com/office/powerpoint/2010/main" val="1395849180"/>
+      </p:ext>
+    </p:extLst>
+  </p:cSld>
+  <p:clrMapOvr>
+    <a:masterClrMapping/>
+  </p:clrMapOvr>
+</p:notes>
+</file>
+
+<file path=ppt/notesSlides/notesSlide12.xml><?xml version="1.0" encoding="utf-8"?>
+<p:notes xmlns:a="http://schemas.openxmlformats.org/drawingml/2006/main" xmlns:r="http://schemas.openxmlformats.org/officeDocument/2006/relationships" xmlns:p="http://schemas.openxmlformats.org/presentationml/2006/main">
+  <p:cSld>
+    <p:spTree>
+      <p:nvGrpSpPr>
+        <p:cNvPr id="1" name=""/>
+        <p:cNvGrpSpPr/>
+        <p:nvPr/>
+      </p:nvGrpSpPr>
+      <p:grpSpPr>
+        <a:xfrm>
+          <a:off x="0" y="0"/>
+          <a:ext cx="0" cy="0"/>
+          <a:chOff x="0" y="0"/>
+          <a:chExt cx="0" cy="0"/>
+        </a:xfrm>
+      </p:grpSpPr>
+      <p:sp>
+        <p:nvSpPr>
+          <p:cNvPr id="2" name="Slide Image Placeholder 1"/>
+          <p:cNvSpPr>
+            <a:spLocks noGrp="1" noRot="1" noChangeAspect="1"/>
+          </p:cNvSpPr>
+          <p:nvPr>
+            <p:ph type="sldImg"/>
+          </p:nvPr>
+        </p:nvSpPr>
+        <p:spPr/>
+      </p:sp>
+      <p:sp>
+        <p:nvSpPr>
+          <p:cNvPr id="3" name="Notes Placeholder 2"/>
+          <p:cNvSpPr>
+            <a:spLocks noGrp="1"/>
+          </p:cNvSpPr>
+          <p:nvPr>
+            <p:ph type="body" idx="1"/>
+          </p:nvPr>
+        </p:nvSpPr>
+        <p:spPr/>
+        <p:txBody>
+          <a:bodyPr/>
+          <a:lstStyle/>
+          <a:p>
+            <a:r>
+              <a:rPr lang="en-US" dirty="0"/>
               <a:t>Utilize features like hot reload, templates, and extensions to speed up development and maintain high code quality across platforms.</a:t>
             </a:r>
           </a:p>
@@ -1092,7 +1196,7 @@
 </p:notes>
 </file>
 
-<file path=ppt/notesSlides/notesSlide12.xml><?xml version="1.0" encoding="utf-8"?>
+<file path=ppt/notesSlides/notesSlide13.xml><?xml version="1.0" encoding="utf-8"?>
 <p:notes xmlns:a="http://schemas.openxmlformats.org/drawingml/2006/main" xmlns:r="http://schemas.openxmlformats.org/officeDocument/2006/relationships" xmlns:p="http://schemas.openxmlformats.org/presentationml/2006/main">
   <p:cSld>
     <p:spTree>
@@ -1246,26 +1350,9 @@
           <a:bodyPr/>
           <a:lstStyle/>
           <a:p>
-            <a:pPr marL="0" marR="0" lvl="0" indent="0" algn="l" defTabSz="914400" rtl="0" eaLnBrk="1" fontAlgn="base" latinLnBrk="0" hangingPunct="1">
-              <a:lnSpc>
-                <a:spcPct val="100000"/>
-              </a:lnSpc>
-              <a:spcBef>
-                <a:spcPct val="30000"/>
-              </a:spcBef>
-              <a:spcAft>
-                <a:spcPct val="0"/>
-              </a:spcAft>
-              <a:buClrTx/>
-              <a:buSzTx/>
-              <a:buFontTx/>
-              <a:buNone/>
-              <a:tabLst/>
-              <a:defRPr/>
-            </a:pPr>
             <a:r>
               <a:rPr lang="en-US" dirty="0"/>
-              <a:t>We will cover an introduction to .NET MAUI, development tools, rapid app building techniques, enhancing apps with the MAUI Community Toolkit, architectural patterns like MVVM, styling options, platform-specific features, and conclude with a Q&amp;A session.</a:t>
+              <a:t>Don’t forget to complete your session survey. We love to read your feedback. It helps to shape future events, and it helps me improve my sessions.</a:t>
             </a:r>
           </a:p>
         </p:txBody>
@@ -1293,7 +1380,7 @@
               <a:pPr>
                 <a:defRPr/>
               </a:pPr>
-              <a:t>3</a:t>
+              <a:t>2</a:t>
             </a:fld>
             <a:endParaRPr lang="en-US"/>
           </a:p>
@@ -1302,7 +1389,7 @@
     </p:spTree>
     <p:extLst>
       <p:ext uri="{BB962C8B-B14F-4D97-AF65-F5344CB8AC3E}">
-        <p14:creationId xmlns:p14="http://schemas.microsoft.com/office/powerpoint/2010/main" val="3557484369"/>
+        <p14:creationId xmlns:p14="http://schemas.microsoft.com/office/powerpoint/2010/main" val="1495906365"/>
       </p:ext>
     </p:extLst>
   </p:cSld>
@@ -1356,70 +1443,26 @@
           <a:bodyPr/>
           <a:lstStyle/>
           <a:p>
+            <a:pPr marL="0" marR="0" lvl="0" indent="0" algn="l" defTabSz="914400" rtl="0" eaLnBrk="1" fontAlgn="base" latinLnBrk="0" hangingPunct="1">
+              <a:lnSpc>
+                <a:spcPct val="100000"/>
+              </a:lnSpc>
+              <a:spcBef>
+                <a:spcPct val="30000"/>
+              </a:spcBef>
+              <a:spcAft>
+                <a:spcPct val="0"/>
+              </a:spcAft>
+              <a:buClrTx/>
+              <a:buSzTx/>
+              <a:buFontTx/>
+              <a:buNone/>
+              <a:tabLst/>
+              <a:defRPr/>
+            </a:pPr>
             <a:r>
               <a:rPr lang="en-US" dirty="0"/>
-              <a:t>A little background about me…</a:t>
-            </a:r>
-          </a:p>
-          <a:p>
-            <a:endParaRPr lang="en-US" dirty="0"/>
-          </a:p>
-          <a:p>
-            <a:r>
-              <a:rPr lang="en-US" dirty="0"/>
-              <a:t>For those who don’t know me, I’ve been in the software industry since 1995, with most of that time (over 25) years spent as a developer and architect using various Microsoft technologies.</a:t>
-            </a:r>
-          </a:p>
-          <a:p>
-            <a:endParaRPr lang="en-US" dirty="0"/>
-          </a:p>
-          <a:p>
-            <a:r>
-              <a:rPr lang="en-US" dirty="0"/>
-              <a:t>Some of you may also be familiar with my blog, the Morning Dew, where I’ve been posting daily links for .NET developers since 2007.</a:t>
-            </a:r>
-          </a:p>
-          <a:p>
-            <a:endParaRPr lang="en-US" dirty="0"/>
-          </a:p>
-          <a:p>
-            <a:r>
-              <a:rPr lang="en-US" dirty="0"/>
-              <a:t>I also have three books from </a:t>
-            </a:r>
-            <a:r>
-              <a:rPr lang="en-US" dirty="0" err="1"/>
-              <a:t>Packt</a:t>
-            </a:r>
-            <a:r>
-              <a:rPr lang="en-US" dirty="0"/>
-              <a:t> Publishing and I’m co-authoring a new book on Model Context Protocol for .NET developers. You can check those out on </a:t>
-            </a:r>
-            <a:r>
-              <a:rPr lang="en-US" dirty="0" err="1"/>
-              <a:t>Packt’s</a:t>
-            </a:r>
-            <a:r>
-              <a:rPr lang="en-US" dirty="0"/>
-              <a:t> website or on Amazon. Just search for my name.</a:t>
-            </a:r>
-          </a:p>
-          <a:p>
-            <a:endParaRPr lang="en-US" dirty="0"/>
-          </a:p>
-          <a:p>
-            <a:r>
-              <a:rPr lang="en-US" dirty="0"/>
-              <a:t>Writing those books led me to pivot my career to technical writing. I joined Microsoft two years ago as a content developer. I write documentation, training modules, and code samples on Microsoft Learn. I work on the Windows developer docs team, helping to maintain the docs for client apps and APIs. I have another talk I give about my work as a content developer and how anyone can contribute to content on Learn through GitHub issues and PRs.</a:t>
-            </a:r>
-          </a:p>
-          <a:p>
-            <a:endParaRPr lang="en-US" dirty="0"/>
-          </a:p>
-          <a:p>
-            <a:r>
-              <a:rPr lang="en-US" dirty="0"/>
-              <a:t>Finally, I’m one of the founding organizers of the TechBash developer conference. We’ve been running the event in the Poconos since 2016.</a:t>
+              <a:t>We will cover an introduction to .NET MAUI, development tools, rapid app building techniques, enhancing apps with the MAUI Community Toolkit, architectural patterns like MVVM, styling options, platform-specific features, and conclude with a Q&amp;A session.</a:t>
             </a:r>
           </a:p>
         </p:txBody>
@@ -1447,7 +1490,7 @@
               <a:pPr>
                 <a:defRPr/>
               </a:pPr>
-              <a:t>4</a:t>
+              <a:t>3</a:t>
             </a:fld>
             <a:endParaRPr lang="en-US"/>
           </a:p>
@@ -1456,7 +1499,7 @@
     </p:spTree>
     <p:extLst>
       <p:ext uri="{BB962C8B-B14F-4D97-AF65-F5344CB8AC3E}">
-        <p14:creationId xmlns:p14="http://schemas.microsoft.com/office/powerpoint/2010/main" val="3938245084"/>
+        <p14:creationId xmlns:p14="http://schemas.microsoft.com/office/powerpoint/2010/main" val="3557484369"/>
       </p:ext>
     </p:extLst>
   </p:cSld>
@@ -1510,26 +1553,70 @@
           <a:bodyPr/>
           <a:lstStyle/>
           <a:p>
-            <a:pPr marL="0" marR="0" lvl="0" indent="0" algn="l" defTabSz="914400" rtl="0" eaLnBrk="1" fontAlgn="base" latinLnBrk="0" hangingPunct="1">
-              <a:lnSpc>
-                <a:spcPct val="100000"/>
-              </a:lnSpc>
-              <a:spcBef>
-                <a:spcPct val="30000"/>
-              </a:spcBef>
-              <a:spcAft>
-                <a:spcPct val="0"/>
-              </a:spcAft>
-              <a:buClrTx/>
-              <a:buSzTx/>
-              <a:buFontTx/>
-              <a:buNone/>
-              <a:tabLst/>
-              <a:defRPr/>
-            </a:pPr>
             <a:r>
               <a:rPr lang="en-US" dirty="0"/>
-              <a:t>This section introduces .NET MAUI, the platforms it supports, and why using a single codebase simplifies development for iOS, Android, macOS, and Windows.</a:t>
+              <a:t>A little background about me…</a:t>
+            </a:r>
+          </a:p>
+          <a:p>
+            <a:endParaRPr lang="en-US" dirty="0"/>
+          </a:p>
+          <a:p>
+            <a:r>
+              <a:rPr lang="en-US" dirty="0"/>
+              <a:t>For those who don’t know me, I’ve been in the software industry since 1995, with most of that time (over 25) years spent as a developer and architect using various Microsoft technologies.</a:t>
+            </a:r>
+          </a:p>
+          <a:p>
+            <a:endParaRPr lang="en-US" dirty="0"/>
+          </a:p>
+          <a:p>
+            <a:r>
+              <a:rPr lang="en-US" dirty="0"/>
+              <a:t>Some of you may also be familiar with my blog, the Morning Dew, where I’ve been posting daily links for .NET developers since 2007.</a:t>
+            </a:r>
+          </a:p>
+          <a:p>
+            <a:endParaRPr lang="en-US" dirty="0"/>
+          </a:p>
+          <a:p>
+            <a:r>
+              <a:rPr lang="en-US" dirty="0"/>
+              <a:t>I also have three books from </a:t>
+            </a:r>
+            <a:r>
+              <a:rPr lang="en-US" dirty="0" err="1"/>
+              <a:t>Packt</a:t>
+            </a:r>
+            <a:r>
+              <a:rPr lang="en-US" dirty="0"/>
+              <a:t> Publishing and I’m co-authoring a new book on Model Context Protocol for .NET developers. You can check those out on </a:t>
+            </a:r>
+            <a:r>
+              <a:rPr lang="en-US" dirty="0" err="1"/>
+              <a:t>Packt’s</a:t>
+            </a:r>
+            <a:r>
+              <a:rPr lang="en-US" dirty="0"/>
+              <a:t> website or on Amazon. Just search for my name.</a:t>
+            </a:r>
+          </a:p>
+          <a:p>
+            <a:endParaRPr lang="en-US" dirty="0"/>
+          </a:p>
+          <a:p>
+            <a:r>
+              <a:rPr lang="en-US" dirty="0"/>
+              <a:t>Writing those books led me to pivot my career to technical writing. I joined Microsoft two years ago as a content developer. I write documentation, training modules, and code samples on Microsoft Learn. I work on the Windows developer docs team, helping to maintain the docs for client apps and APIs. I have another talk I give about my work as a content developer and how anyone can contribute to content on Learn through GitHub issues and PRs.</a:t>
+            </a:r>
+          </a:p>
+          <a:p>
+            <a:endParaRPr lang="en-US" dirty="0"/>
+          </a:p>
+          <a:p>
+            <a:r>
+              <a:rPr lang="en-US" dirty="0"/>
+              <a:t>Finally, I’m one of the founding organizers of the TechBash developer conference. We’ve been running the event in the Poconos since 2016.</a:t>
             </a:r>
           </a:p>
         </p:txBody>
@@ -1557,7 +1644,7 @@
               <a:pPr>
                 <a:defRPr/>
               </a:pPr>
-              <a:t>5</a:t>
+              <a:t>4</a:t>
             </a:fld>
             <a:endParaRPr lang="en-US"/>
           </a:p>
@@ -1566,7 +1653,7 @@
     </p:spTree>
     <p:extLst>
       <p:ext uri="{BB962C8B-B14F-4D97-AF65-F5344CB8AC3E}">
-        <p14:creationId xmlns:p14="http://schemas.microsoft.com/office/powerpoint/2010/main" val="1563809891"/>
+        <p14:creationId xmlns:p14="http://schemas.microsoft.com/office/powerpoint/2010/main" val="3938245084"/>
       </p:ext>
     </p:extLst>
   </p:cSld>
@@ -1639,7 +1726,7 @@
             </a:pPr>
             <a:r>
               <a:rPr lang="en-US" dirty="0"/>
-              <a:t>.NET MAUI stands for Multi-platform App UI, enabling developers to build apps across major desktop and mobile platforms with one framework and codebase.</a:t>
+              <a:t>This section introduces .NET MAUI, the platforms it supports, and why using a single codebase simplifies development for iOS, Android, macOS, and Windows.</a:t>
             </a:r>
           </a:p>
         </p:txBody>
@@ -1667,7 +1754,7 @@
               <a:pPr>
                 <a:defRPr/>
               </a:pPr>
-              <a:t>6</a:t>
+              <a:t>5</a:t>
             </a:fld>
             <a:endParaRPr lang="en-US"/>
           </a:p>
@@ -1676,7 +1763,7 @@
     </p:spTree>
     <p:extLst>
       <p:ext uri="{BB962C8B-B14F-4D97-AF65-F5344CB8AC3E}">
-        <p14:creationId xmlns:p14="http://schemas.microsoft.com/office/powerpoint/2010/main" val="1844951024"/>
+        <p14:creationId xmlns:p14="http://schemas.microsoft.com/office/powerpoint/2010/main" val="1563809891"/>
       </p:ext>
     </p:extLst>
   </p:cSld>
@@ -1749,7 +1836,7 @@
             </a:pPr>
             <a:r>
               <a:rPr lang="en-US" dirty="0"/>
-              <a:t>A unified codebase reduces maintenance effort, speeds up development, and allows code reuse, making it easier to deliver consistent experiences across devices.</a:t>
+              <a:t>.NET MAUI stands for Multi-platform App UI, enabling developers to build apps across major desktop and mobile platforms with one framework and codebase.</a:t>
             </a:r>
           </a:p>
         </p:txBody>
@@ -1777,7 +1864,7 @@
               <a:pPr>
                 <a:defRPr/>
               </a:pPr>
-              <a:t>7</a:t>
+              <a:t>6</a:t>
             </a:fld>
             <a:endParaRPr lang="en-US"/>
           </a:p>
@@ -1786,7 +1873,7 @@
     </p:spTree>
     <p:extLst>
       <p:ext uri="{BB962C8B-B14F-4D97-AF65-F5344CB8AC3E}">
-        <p14:creationId xmlns:p14="http://schemas.microsoft.com/office/powerpoint/2010/main" val="2870781801"/>
+        <p14:creationId xmlns:p14="http://schemas.microsoft.com/office/powerpoint/2010/main" val="1844951024"/>
       </p:ext>
     </p:extLst>
   </p:cSld>
@@ -1859,15 +1946,7 @@
             </a:pPr>
             <a:r>
               <a:rPr lang="en-US" dirty="0"/>
-              <a:t>.NET MAUI improves upon </a:t>
-            </a:r>
-            <a:r>
-              <a:rPr lang="en-US" dirty="0" err="1"/>
-              <a:t>Xamarin.Forms</a:t>
-            </a:r>
-            <a:r>
-              <a:rPr lang="en-US" dirty="0"/>
-              <a:t> with better architecture, enhanced performance, and streamlined project structure, offering a more modern development experience.</a:t>
+              <a:t>A unified codebase reduces maintenance effort, speeds up development, and allows code reuse, making it easier to deliver consistent experiences across devices.</a:t>
             </a:r>
           </a:p>
         </p:txBody>
@@ -1895,7 +1974,7 @@
               <a:pPr>
                 <a:defRPr/>
               </a:pPr>
-              <a:t>8</a:t>
+              <a:t>7</a:t>
             </a:fld>
             <a:endParaRPr lang="en-US"/>
           </a:p>
@@ -1904,7 +1983,7 @@
     </p:spTree>
     <p:extLst>
       <p:ext uri="{BB962C8B-B14F-4D97-AF65-F5344CB8AC3E}">
-        <p14:creationId xmlns:p14="http://schemas.microsoft.com/office/powerpoint/2010/main" val="3794117661"/>
+        <p14:creationId xmlns:p14="http://schemas.microsoft.com/office/powerpoint/2010/main" val="2870781801"/>
       </p:ext>
     </p:extLst>
   </p:cSld>
@@ -1977,7 +2056,15 @@
             </a:pPr>
             <a:r>
               <a:rPr lang="en-US" dirty="0"/>
-              <a:t>Explore the integrated development environments and tools available on Windows and macOS to build, debug, and deploy .NET MAUI applications efficiently.</a:t>
+              <a:t>.NET MAUI improves upon </a:t>
+            </a:r>
+            <a:r>
+              <a:rPr lang="en-US" dirty="0" err="1"/>
+              <a:t>Xamarin.Forms</a:t>
+            </a:r>
+            <a:r>
+              <a:rPr lang="en-US" dirty="0"/>
+              <a:t> with better architecture, enhanced performance, and streamlined project structure, offering a more modern development experience.</a:t>
             </a:r>
           </a:p>
         </p:txBody>
@@ -2005,7 +2092,7 @@
               <a:pPr>
                 <a:defRPr/>
               </a:pPr>
-              <a:t>9</a:t>
+              <a:t>8</a:t>
             </a:fld>
             <a:endParaRPr lang="en-US"/>
           </a:p>
@@ -2014,7 +2101,7 @@
     </p:spTree>
     <p:extLst>
       <p:ext uri="{BB962C8B-B14F-4D97-AF65-F5344CB8AC3E}">
-        <p14:creationId xmlns:p14="http://schemas.microsoft.com/office/powerpoint/2010/main" val="1009787909"/>
+        <p14:creationId xmlns:p14="http://schemas.microsoft.com/office/powerpoint/2010/main" val="3794117661"/>
       </p:ext>
     </p:extLst>
   </p:cSld>
@@ -2068,9 +2155,26 @@
           <a:bodyPr/>
           <a:lstStyle/>
           <a:p>
+            <a:pPr marL="0" marR="0" lvl="0" indent="0" algn="l" defTabSz="914400" rtl="0" eaLnBrk="1" fontAlgn="base" latinLnBrk="0" hangingPunct="1">
+              <a:lnSpc>
+                <a:spcPct val="100000"/>
+              </a:lnSpc>
+              <a:spcBef>
+                <a:spcPct val="30000"/>
+              </a:spcBef>
+              <a:spcAft>
+                <a:spcPct val="0"/>
+              </a:spcAft>
+              <a:buClrTx/>
+              <a:buSzTx/>
+              <a:buFontTx/>
+              <a:buNone/>
+              <a:tabLst/>
+              <a:defRPr/>
+            </a:pPr>
             <a:r>
               <a:rPr lang="en-US" dirty="0"/>
-              <a:t>Visual Studio on Windows and macOS are primary IDEs, complemented by VS Code and command-line tools that support .NET MAUI development workflows.</a:t>
+              <a:t>Explore the integrated development environments and tools available on Windows and macOS to build, debug, and deploy .NET MAUI applications efficiently.</a:t>
             </a:r>
           </a:p>
         </p:txBody>
@@ -2098,7 +2202,7 @@
               <a:pPr>
                 <a:defRPr/>
               </a:pPr>
-              <a:t>10</a:t>
+              <a:t>9</a:t>
             </a:fld>
             <a:endParaRPr lang="en-US"/>
           </a:p>
@@ -2107,7 +2211,7 @@
     </p:spTree>
     <p:extLst>
       <p:ext uri="{BB962C8B-B14F-4D97-AF65-F5344CB8AC3E}">
-        <p14:creationId xmlns:p14="http://schemas.microsoft.com/office/powerpoint/2010/main" val="3368702723"/>
+        <p14:creationId xmlns:p14="http://schemas.microsoft.com/office/powerpoint/2010/main" val="1009787909"/>
       </p:ext>
     </p:extLst>
   </p:cSld>
@@ -2306,7 +2410,7 @@
               <a:pPr>
                 <a:defRPr/>
               </a:pPr>
-              <a:t>10/11/2025</a:t>
+              <a:t>11/9/2025</a:t>
             </a:fld>
             <a:endParaRPr lang="en-US"/>
           </a:p>
@@ -2463,7 +2567,7 @@
               <a:pPr>
                 <a:defRPr/>
               </a:pPr>
-              <a:t>10/11/2025</a:t>
+              <a:t>11/9/2025</a:t>
             </a:fld>
             <a:endParaRPr lang="en-US"/>
           </a:p>
@@ -2630,7 +2734,7 @@
               <a:pPr>
                 <a:defRPr/>
               </a:pPr>
-              <a:t>10/11/2025</a:t>
+              <a:t>11/9/2025</a:t>
             </a:fld>
             <a:endParaRPr lang="en-US"/>
           </a:p>
@@ -2860,7 +2964,7 @@
               <a:pPr>
                 <a:defRPr/>
               </a:pPr>
-              <a:t>10/11/2025</a:t>
+              <a:t>11/9/2025</a:t>
             </a:fld>
             <a:endParaRPr lang="en-US"/>
           </a:p>
@@ -3027,7 +3131,7 @@
               <a:pPr>
                 <a:defRPr/>
               </a:pPr>
-              <a:t>10/11/2025</a:t>
+              <a:t>11/9/2025</a:t>
             </a:fld>
             <a:endParaRPr lang="en-US" dirty="0"/>
           </a:p>
@@ -3261,7 +3365,7 @@
               <a:pPr>
                 <a:defRPr/>
               </a:pPr>
-              <a:t>10/11/2025</a:t>
+              <a:t>11/9/2025</a:t>
             </a:fld>
             <a:endParaRPr lang="en-US"/>
           </a:p>
@@ -3535,7 +3639,7 @@
               <a:pPr>
                 <a:defRPr/>
               </a:pPr>
-              <a:t>10/11/2025</a:t>
+              <a:t>11/9/2025</a:t>
             </a:fld>
             <a:endParaRPr lang="en-US"/>
           </a:p>
@@ -3948,7 +4052,7 @@
               <a:pPr>
                 <a:defRPr/>
               </a:pPr>
-              <a:t>10/11/2025</a:t>
+              <a:t>11/9/2025</a:t>
             </a:fld>
             <a:endParaRPr lang="en-US"/>
           </a:p>
@@ -4054,7 +4158,7 @@
               <a:pPr>
                 <a:defRPr/>
               </a:pPr>
-              <a:t>10/11/2025</a:t>
+              <a:t>11/9/2025</a:t>
             </a:fld>
             <a:endParaRPr lang="en-US"/>
           </a:p>
@@ -4138,7 +4242,7 @@
               <a:pPr>
                 <a:defRPr/>
               </a:pPr>
-              <a:t>10/11/2025</a:t>
+              <a:t>11/9/2025</a:t>
             </a:fld>
             <a:endParaRPr lang="en-US"/>
           </a:p>
@@ -4402,7 +4506,7 @@
               <a:pPr>
                 <a:defRPr/>
               </a:pPr>
-              <a:t>10/11/2025</a:t>
+              <a:t>11/9/2025</a:t>
             </a:fld>
             <a:endParaRPr lang="en-US"/>
           </a:p>
@@ -4567,7 +4671,7 @@
               <a:pPr>
                 <a:defRPr/>
               </a:pPr>
-              <a:t>10/11/2025</a:t>
+              <a:t>11/9/2025</a:t>
             </a:fld>
             <a:endParaRPr lang="en-US" dirty="0"/>
           </a:p>
@@ -4814,7 +4918,7 @@
               <a:pPr>
                 <a:defRPr/>
               </a:pPr>
-              <a:t>10/11/2025</a:t>
+              <a:t>11/9/2025</a:t>
             </a:fld>
             <a:endParaRPr lang="en-US"/>
           </a:p>
@@ -4971,7 +5075,7 @@
               <a:pPr>
                 <a:defRPr/>
               </a:pPr>
-              <a:t>10/11/2025</a:t>
+              <a:t>11/9/2025</a:t>
             </a:fld>
             <a:endParaRPr lang="en-US"/>
           </a:p>
@@ -5138,7 +5242,7 @@
               <a:pPr>
                 <a:defRPr/>
               </a:pPr>
-              <a:t>10/11/2025</a:t>
+              <a:t>11/9/2025</a:t>
             </a:fld>
             <a:endParaRPr lang="en-US"/>
           </a:p>
@@ -5372,7 +5476,7 @@
               <a:pPr>
                 <a:defRPr/>
               </a:pPr>
-              <a:t>10/11/2025</a:t>
+              <a:t>11/9/2025</a:t>
             </a:fld>
             <a:endParaRPr lang="en-US"/>
           </a:p>
@@ -5646,7 +5750,7 @@
               <a:pPr>
                 <a:defRPr/>
               </a:pPr>
-              <a:t>10/11/2025</a:t>
+              <a:t>11/9/2025</a:t>
             </a:fld>
             <a:endParaRPr lang="en-US"/>
           </a:p>
@@ -6059,7 +6163,7 @@
               <a:pPr>
                 <a:defRPr/>
               </a:pPr>
-              <a:t>10/11/2025</a:t>
+              <a:t>11/9/2025</a:t>
             </a:fld>
             <a:endParaRPr lang="en-US"/>
           </a:p>
@@ -6165,7 +6269,7 @@
               <a:pPr>
                 <a:defRPr/>
               </a:pPr>
-              <a:t>10/11/2025</a:t>
+              <a:t>11/9/2025</a:t>
             </a:fld>
             <a:endParaRPr lang="en-US"/>
           </a:p>
@@ -6249,7 +6353,7 @@
               <a:pPr>
                 <a:defRPr/>
               </a:pPr>
-              <a:t>10/11/2025</a:t>
+              <a:t>11/9/2025</a:t>
             </a:fld>
             <a:endParaRPr lang="en-US"/>
           </a:p>
@@ -6513,7 +6617,7 @@
               <a:pPr>
                 <a:defRPr/>
               </a:pPr>
-              <a:t>10/11/2025</a:t>
+              <a:t>11/9/2025</a:t>
             </a:fld>
             <a:endParaRPr lang="en-US"/>
           </a:p>
@@ -6757,7 +6861,7 @@
               <a:pPr>
                 <a:defRPr/>
               </a:pPr>
-              <a:t>10/11/2025</a:t>
+              <a:t>11/9/2025</a:t>
             </a:fld>
             <a:endParaRPr lang="en-US"/>
           </a:p>
@@ -6990,7 +7094,7 @@
               <a:pPr>
                 <a:defRPr/>
               </a:pPr>
-              <a:t>10/11/2025</a:t>
+              <a:t>11/9/2025</a:t>
             </a:fld>
             <a:endParaRPr lang="en-US"/>
           </a:p>
@@ -7669,7 +7773,7 @@
               <a:pPr>
                 <a:defRPr/>
               </a:pPr>
-              <a:t>10/11/2025</a:t>
+              <a:t>11/9/2025</a:t>
             </a:fld>
             <a:endParaRPr lang="en-US"/>
           </a:p>
@@ -9646,7 +9750,7 @@
           <p:nvPr/>
         </p:nvPicPr>
         <p:blipFill>
-          <a:blip r:embed="rId2">
+          <a:blip r:embed="rId3">
             <a:extLst>
               <a:ext uri="{28A0092B-C50C-407E-A947-70E740481C1C}">
                 <a14:useLocalDpi xmlns:a14="http://schemas.microsoft.com/office/drawing/2010/main" val="0"/>
@@ -10810,7 +10914,7 @@
         </p:spPr>
         <p:txBody>
           <a:bodyPr>
-            <a:normAutofit fontScale="62500" lnSpcReduction="20000"/>
+            <a:normAutofit fontScale="70000" lnSpcReduction="20000"/>
           </a:bodyPr>
           <a:lstStyle/>
           <a:p>
@@ -10821,7 +10925,7 @@
             </a:pPr>
             <a:r>
               <a:rPr lang="en-US" dirty="0"/>
-              <a:t>About Me: Speaker Introduction</a:t>
+              <a:t>About Me</a:t>
             </a:r>
           </a:p>
           <a:p>
@@ -10832,7 +10936,7 @@
             </a:pPr>
             <a:r>
               <a:rPr lang="en-US" dirty="0"/>
-              <a:t>Introduction to .NET MAUI and Cross-Platform App Development</a:t>
+              <a:t>Introduction to .NET MAUI and Cross-Platform Apps</a:t>
             </a:r>
           </a:p>
           <a:p>
@@ -10854,13 +10958,8 @@
             </a:pPr>
             <a:r>
               <a:rPr lang="en-US" dirty="0"/>
-              <a:t>Rapid App Building With XAML, C# &amp; Visual Studio </a:t>
-            </a:r>
-            <a:r>
-              <a:rPr lang="en-US" dirty="0" err="1"/>
-              <a:t>vNext</a:t>
-            </a:r>
-            <a:endParaRPr lang="en-US" dirty="0"/>
+              <a:t>Rapid App Building with XAML, C# &amp; Visual Studio</a:t>
+            </a:r>
           </a:p>
           <a:p>
             <a:pPr>
@@ -10892,7 +10991,7 @@
             </a:pPr>
             <a:r>
               <a:rPr lang="en-US" dirty="0"/>
-              <a:t>Build MAUI Apps with C# Markup in VS Code: No XAML Required</a:t>
+              <a:t>Build Apps with C# Markup in VS Code: No XAML Required</a:t>
             </a:r>
           </a:p>
           <a:p>
@@ -10903,7 +11002,7 @@
             </a:pPr>
             <a:r>
               <a:rPr lang="en-US" dirty="0"/>
-              <a:t>Style Apps With CSS in .NET MAUI (in JetBrains Rider)</a:t>
+              <a:t>Style Apps with CSS</a:t>
             </a:r>
           </a:p>
           <a:p>
@@ -10914,7 +11013,7 @@
             </a:pPr>
             <a:r>
               <a:rPr lang="en-US" dirty="0"/>
-              <a:t>Access Platform-Specific Features With .NET MAUI</a:t>
+              <a:t>Access Platform-Specific Features</a:t>
             </a:r>
           </a:p>
           <a:p>
@@ -10925,7 +11024,7 @@
             </a:pPr>
             <a:r>
               <a:rPr lang="en-US" dirty="0"/>
-              <a:t>Q&amp;A: Your .NET MAUI Questions Answered</a:t>
+              <a:t>Q&amp;A</a:t>
             </a:r>
           </a:p>
         </p:txBody>

</xml_diff>

<commit_message>
Update maui pptx and gitignore (for rider)
</commit_message>
<xml_diff>
--- a/2025/1116_VSLiveOrlando/Maui Toolkit/Create Multi-Platform Apps with .NET.pptx
+++ b/2025/1116_VSLiveOrlando/Maui Toolkit/Create Multi-Platform Apps with .NET.pptx
@@ -442,7 +442,7 @@
               <a:pPr>
                 <a:defRPr/>
               </a:pPr>
-              <a:t>11/9/2025</a:t>
+              <a:t>11/15/2025</a:t>
             </a:fld>
             <a:endParaRPr lang="en-US"/>
           </a:p>
@@ -1616,7 +1616,7 @@
           <a:p>
             <a:r>
               <a:rPr lang="en-US" dirty="0"/>
-              <a:t>Finally, I’m one of the founding organizers of the TechBash developer conference. We’ve been running the event in the Poconos since 2016.</a:t>
+              <a:t>Finally, I’m one of the founding organizers of the TechBash developer conference. We’ve been running the event in the Poconos since 2016, and we just announce we’re coming back for another year next October.</a:t>
             </a:r>
           </a:p>
         </p:txBody>
@@ -2064,7 +2064,15 @@
             </a:r>
             <a:r>
               <a:rPr lang="en-US" dirty="0"/>
-              <a:t> with better architecture, enhanced performance, and streamlined project structure, offering a more modern development experience.</a:t>
+              <a:t> with better architecture, enhanced performance, and streamlined project structure, offering a </a:t>
+            </a:r>
+            <a:r>
+              <a:rPr lang="en-US"/>
+              <a:t>simplified and </a:t>
+            </a:r>
+            <a:r>
+              <a:rPr lang="en-US" dirty="0"/>
+              <a:t>modern development experience.</a:t>
             </a:r>
           </a:p>
         </p:txBody>
@@ -2410,7 +2418,7 @@
               <a:pPr>
                 <a:defRPr/>
               </a:pPr>
-              <a:t>11/9/2025</a:t>
+              <a:t>11/15/2025</a:t>
             </a:fld>
             <a:endParaRPr lang="en-US"/>
           </a:p>
@@ -2567,7 +2575,7 @@
               <a:pPr>
                 <a:defRPr/>
               </a:pPr>
-              <a:t>11/9/2025</a:t>
+              <a:t>11/15/2025</a:t>
             </a:fld>
             <a:endParaRPr lang="en-US"/>
           </a:p>
@@ -2734,7 +2742,7 @@
               <a:pPr>
                 <a:defRPr/>
               </a:pPr>
-              <a:t>11/9/2025</a:t>
+              <a:t>11/15/2025</a:t>
             </a:fld>
             <a:endParaRPr lang="en-US"/>
           </a:p>
@@ -2964,7 +2972,7 @@
               <a:pPr>
                 <a:defRPr/>
               </a:pPr>
-              <a:t>11/9/2025</a:t>
+              <a:t>11/15/2025</a:t>
             </a:fld>
             <a:endParaRPr lang="en-US"/>
           </a:p>
@@ -3131,7 +3139,7 @@
               <a:pPr>
                 <a:defRPr/>
               </a:pPr>
-              <a:t>11/9/2025</a:t>
+              <a:t>11/15/2025</a:t>
             </a:fld>
             <a:endParaRPr lang="en-US" dirty="0"/>
           </a:p>
@@ -3365,7 +3373,7 @@
               <a:pPr>
                 <a:defRPr/>
               </a:pPr>
-              <a:t>11/9/2025</a:t>
+              <a:t>11/15/2025</a:t>
             </a:fld>
             <a:endParaRPr lang="en-US"/>
           </a:p>
@@ -3639,7 +3647,7 @@
               <a:pPr>
                 <a:defRPr/>
               </a:pPr>
-              <a:t>11/9/2025</a:t>
+              <a:t>11/15/2025</a:t>
             </a:fld>
             <a:endParaRPr lang="en-US"/>
           </a:p>
@@ -4052,7 +4060,7 @@
               <a:pPr>
                 <a:defRPr/>
               </a:pPr>
-              <a:t>11/9/2025</a:t>
+              <a:t>11/15/2025</a:t>
             </a:fld>
             <a:endParaRPr lang="en-US"/>
           </a:p>
@@ -4158,7 +4166,7 @@
               <a:pPr>
                 <a:defRPr/>
               </a:pPr>
-              <a:t>11/9/2025</a:t>
+              <a:t>11/15/2025</a:t>
             </a:fld>
             <a:endParaRPr lang="en-US"/>
           </a:p>
@@ -4242,7 +4250,7 @@
               <a:pPr>
                 <a:defRPr/>
               </a:pPr>
-              <a:t>11/9/2025</a:t>
+              <a:t>11/15/2025</a:t>
             </a:fld>
             <a:endParaRPr lang="en-US"/>
           </a:p>
@@ -4506,7 +4514,7 @@
               <a:pPr>
                 <a:defRPr/>
               </a:pPr>
-              <a:t>11/9/2025</a:t>
+              <a:t>11/15/2025</a:t>
             </a:fld>
             <a:endParaRPr lang="en-US"/>
           </a:p>
@@ -4671,7 +4679,7 @@
               <a:pPr>
                 <a:defRPr/>
               </a:pPr>
-              <a:t>11/9/2025</a:t>
+              <a:t>11/15/2025</a:t>
             </a:fld>
             <a:endParaRPr lang="en-US" dirty="0"/>
           </a:p>
@@ -4918,7 +4926,7 @@
               <a:pPr>
                 <a:defRPr/>
               </a:pPr>
-              <a:t>11/9/2025</a:t>
+              <a:t>11/15/2025</a:t>
             </a:fld>
             <a:endParaRPr lang="en-US"/>
           </a:p>
@@ -5075,7 +5083,7 @@
               <a:pPr>
                 <a:defRPr/>
               </a:pPr>
-              <a:t>11/9/2025</a:t>
+              <a:t>11/15/2025</a:t>
             </a:fld>
             <a:endParaRPr lang="en-US"/>
           </a:p>
@@ -5242,7 +5250,7 @@
               <a:pPr>
                 <a:defRPr/>
               </a:pPr>
-              <a:t>11/9/2025</a:t>
+              <a:t>11/15/2025</a:t>
             </a:fld>
             <a:endParaRPr lang="en-US"/>
           </a:p>
@@ -5476,7 +5484,7 @@
               <a:pPr>
                 <a:defRPr/>
               </a:pPr>
-              <a:t>11/9/2025</a:t>
+              <a:t>11/15/2025</a:t>
             </a:fld>
             <a:endParaRPr lang="en-US"/>
           </a:p>
@@ -5750,7 +5758,7 @@
               <a:pPr>
                 <a:defRPr/>
               </a:pPr>
-              <a:t>11/9/2025</a:t>
+              <a:t>11/15/2025</a:t>
             </a:fld>
             <a:endParaRPr lang="en-US"/>
           </a:p>
@@ -6163,7 +6171,7 @@
               <a:pPr>
                 <a:defRPr/>
               </a:pPr>
-              <a:t>11/9/2025</a:t>
+              <a:t>11/15/2025</a:t>
             </a:fld>
             <a:endParaRPr lang="en-US"/>
           </a:p>
@@ -6269,7 +6277,7 @@
               <a:pPr>
                 <a:defRPr/>
               </a:pPr>
-              <a:t>11/9/2025</a:t>
+              <a:t>11/15/2025</a:t>
             </a:fld>
             <a:endParaRPr lang="en-US"/>
           </a:p>
@@ -6353,7 +6361,7 @@
               <a:pPr>
                 <a:defRPr/>
               </a:pPr>
-              <a:t>11/9/2025</a:t>
+              <a:t>11/15/2025</a:t>
             </a:fld>
             <a:endParaRPr lang="en-US"/>
           </a:p>
@@ -6617,7 +6625,7 @@
               <a:pPr>
                 <a:defRPr/>
               </a:pPr>
-              <a:t>11/9/2025</a:t>
+              <a:t>11/15/2025</a:t>
             </a:fld>
             <a:endParaRPr lang="en-US"/>
           </a:p>
@@ -6861,7 +6869,7 @@
               <a:pPr>
                 <a:defRPr/>
               </a:pPr>
-              <a:t>11/9/2025</a:t>
+              <a:t>11/15/2025</a:t>
             </a:fld>
             <a:endParaRPr lang="en-US"/>
           </a:p>
@@ -7094,7 +7102,7 @@
               <a:pPr>
                 <a:defRPr/>
               </a:pPr>
-              <a:t>11/9/2025</a:t>
+              <a:t>11/15/2025</a:t>
             </a:fld>
             <a:endParaRPr lang="en-US"/>
           </a:p>
@@ -7773,7 +7781,7 @@
               <a:pPr>
                 <a:defRPr/>
               </a:pPr>
-              <a:t>11/9/2025</a:t>
+              <a:t>11/15/2025</a:t>
             </a:fld>
             <a:endParaRPr lang="en-US"/>
           </a:p>
@@ -11819,7 +11827,7 @@
           <a:p>
             <a:r>
               <a:rPr lang="en-US" sz="2000" dirty="0"/>
-              <a:t>Three (soon to be four) books for </a:t>
+              <a:t>Three books for </a:t>
             </a:r>
             <a:r>
               <a:rPr lang="en-US" sz="2000" dirty="0" err="1"/>
@@ -11845,16 +11853,16 @@
             </a:r>
           </a:p>
           <a:p>
+            <a:r>
+              <a:rPr lang="en-US" sz="2000" dirty="0"/>
+              <a:t>TechBash Dev Conference organizer since 2016</a:t>
+            </a:r>
+          </a:p>
+          <a:p>
             <a:pPr lvl="1"/>
             <a:r>
-              <a:rPr lang="en-US" sz="1800" dirty="0"/>
-              <a:t>MCP for .NET Developers (coming March 2026 - co-author)</a:t>
-            </a:r>
-          </a:p>
-          <a:p>
-            <a:r>
-              <a:rPr lang="en-US" sz="2000" dirty="0"/>
-              <a:t>TechBash dev conference organizer since 2016</a:t>
+              <a:rPr lang="en-US" sz="1600" dirty="0"/>
+              <a:t>TechBash 2026: Oct 13-16 @ Kalahari Resort Poconos</a:t>
             </a:r>
           </a:p>
         </p:txBody>

</xml_diff>

<commit_message>
Tweak slides and remove old file
</commit_message>
<xml_diff>
--- a/2025/1116_VSLiveOrlando/Maui Toolkit/Create Multi-Platform Apps with .NET.pptx
+++ b/2025/1116_VSLiveOrlando/Maui Toolkit/Create Multi-Platform Apps with .NET.pptx
@@ -963,8 +963,13 @@
           <a:p>
             <a:r>
               <a:rPr lang="en-US" dirty="0"/>
-              <a:t>Visual Studio on Windows and macOS are primary IDEs, complemented by VS Code and command-line tools that support .NET MAUI development workflows.</a:t>
-            </a:r>
+              <a:t>Visual Studio on Windows and macOS are primary IDEs, complemented by VS Code and command-line tools that support .NET MAUI development workflows. JetBrains Rider is also available on both platforms for folks who either have a subscription or use it through the </a:t>
+            </a:r>
+            <a:r>
+              <a:rPr lang="en-US"/>
+              <a:t>community license.</a:t>
+            </a:r>
+            <a:endParaRPr lang="en-US" dirty="0"/>
           </a:p>
         </p:txBody>
       </p:sp>
@@ -2182,7 +2187,7 @@
             </a:pPr>
             <a:r>
               <a:rPr lang="en-US" dirty="0"/>
-              <a:t>Explore the integrated development environments and tools available on Windows and macOS to build, debug, and deploy .NET MAUI applications efficiently.</a:t>
+              <a:t>Next we’ll discuss the IDEs and tools available on Windows and macOS to build, debug, and deploy .NET MAUI applications.</a:t>
             </a:r>
           </a:p>
         </p:txBody>

</xml_diff>

<commit_message>
Rename project folders and remove txt file
</commit_message>
<xml_diff>
--- a/2025/1116_VSLiveOrlando/Maui Toolkit/Create Multi-Platform Apps with .NET.pptx
+++ b/2025/1116_VSLiveOrlando/Maui Toolkit/Create Multi-Platform Apps with .NET.pptx
@@ -963,13 +963,8 @@
           <a:p>
             <a:r>
               <a:rPr lang="en-US" dirty="0"/>
-              <a:t>Visual Studio on Windows and macOS are primary IDEs, complemented by VS Code and command-line tools that support .NET MAUI development workflows. JetBrains Rider is also available on both platforms for folks who either have a subscription or use it through the </a:t>
-            </a:r>
-            <a:r>
-              <a:rPr lang="en-US"/>
-              <a:t>community license.</a:t>
-            </a:r>
-            <a:endParaRPr lang="en-US" dirty="0"/>
+              <a:t>Visual Studio on Windows and macOS are primary IDEs, complemented by VS Code and command-line tools that support .NET MAUI development workflows. JetBrains Rider is also available on both platforms for folks who either have a subscription or use it through the community license.</a:t>
+            </a:r>
           </a:p>
         </p:txBody>
       </p:sp>
@@ -8561,7 +8556,14 @@
             <a:pPr lvl="1"/>
             <a:r>
               <a:rPr lang="en-US" sz="1800" dirty="0"/>
-              <a:t>Visual Studio on Windows and VS Code on Windows and macOS serve as the main development environments for .NET MAUI development.</a:t>
+              <a:t>Visual Studio on Windows</a:t>
+            </a:r>
+          </a:p>
+          <a:p>
+            <a:pPr lvl="1"/>
+            <a:r>
+              <a:rPr lang="en-US" sz="1800" dirty="0"/>
+              <a:t>VS Code on Windows and macOS</a:t>
             </a:r>
           </a:p>
           <a:p>
@@ -8574,7 +8576,14 @@
             <a:pPr lvl="1"/>
             <a:r>
               <a:rPr lang="en-US" sz="1800" dirty="0"/>
-              <a:t>VS Code, GitHub Copilot, and CLI tools complement the primary IDEs by supporting flexible and lightweight development workflows. .NET MAUI Community Toolkit offers open-source controls and helpers for your apps.</a:t>
+              <a:t>Assistants like GitHub Copilot and CLI tools complement the primary IDEs.</a:t>
+            </a:r>
+          </a:p>
+          <a:p>
+            <a:pPr lvl="1"/>
+            <a:r>
+              <a:rPr lang="en-US" sz="1800" dirty="0"/>
+              <a:t>.NET MAUI Community Toolkit offers open-source controls and helpers for your apps.</a:t>
             </a:r>
           </a:p>
           <a:p>
@@ -8587,7 +8596,7 @@
             <a:pPr lvl="1"/>
             <a:r>
               <a:rPr lang="en-US" sz="1800" dirty="0"/>
-              <a:t>JetBrains Rider supports .NET MAUI development on Windows and macOS.</a:t>
+              <a:t>JetBrains Rider on Windows and macOS.</a:t>
             </a:r>
           </a:p>
         </p:txBody>
@@ -8673,7 +8682,7 @@
           <a:p>
             <a:r>
               <a:rPr lang="en-US" sz="2400" dirty="0"/>
-              <a:t>Debugging Tools Usage</a:t>
+              <a:t>Debugging Tools</a:t>
             </a:r>
           </a:p>
           <a:p>
@@ -8693,7 +8702,20 @@
             <a:pPr lvl="1"/>
             <a:r>
               <a:rPr lang="en-US" sz="2000" dirty="0"/>
-              <a:t>Simulators and emulators for Android and iOS replicate different platforms, enabling real-time testing without physical devices. Connect to a Mac from Visual Studio on Windows to debug iOS apps from your favorite IDE.</a:t>
+              <a:t>Emulators for Android and iOS simulators replicate supported platforms, enabling real-time testing without physical devices.</a:t>
+            </a:r>
+          </a:p>
+          <a:p>
+            <a:pPr lvl="2"/>
+            <a:r>
+              <a:rPr lang="en-US" sz="1600" dirty="0"/>
+              <a:t>Connect to a Mac from Visual Studio on Windows to debug iOS apps from your favorite IDE.</a:t>
+            </a:r>
+          </a:p>
+          <a:p>
+            <a:r>
+              <a:rPr lang="en-US" sz="2400" dirty="0"/>
+              <a:t>Debug on provisioned devices</a:t>
             </a:r>
           </a:p>
         </p:txBody>
@@ -8799,7 +8821,7 @@
             <a:pPr lvl="1"/>
             <a:r>
               <a:rPr lang="en-US" sz="2000" dirty="0"/>
-              <a:t>Templates provide reusable structures, enhancing consistency &amp; saving time coding.</a:t>
+              <a:t>Project and file templates provide reusable structures, enhancing consistency &amp; saving time coding.</a:t>
             </a:r>
           </a:p>
           <a:p>
@@ -8812,7 +8834,7 @@
             <a:pPr lvl="1"/>
             <a:r>
               <a:rPr lang="en-US" sz="2000" dirty="0"/>
-              <a:t>Visual Studio &amp; VS Code extensions add functionality &amp; help maintain high code quality across platforms.</a:t>
+              <a:t>Visual Studio &amp; VS Code extensions add functionality &amp; help maintain high code quality.</a:t>
             </a:r>
           </a:p>
         </p:txBody>
@@ -8860,12 +8882,19 @@
             <a:spLocks noGrp="1"/>
           </p:cNvSpPr>
           <p:nvPr>
-            <p:ph type="title"/>
-          </p:nvPr>
-        </p:nvSpPr>
-        <p:spPr/>
-        <p:txBody>
-          <a:bodyPr/>
+            <p:ph type="ctrTitle"/>
+          </p:nvPr>
+        </p:nvSpPr>
+        <p:spPr>
+          <a:xfrm>
+            <a:off x="685800" y="1597821"/>
+            <a:ext cx="7772400" cy="1102519"/>
+          </a:xfrm>
+        </p:spPr>
+        <p:txBody>
+          <a:bodyPr wrap="square" anchor="ctr">
+            <a:normAutofit/>
+          </a:bodyPr>
           <a:lstStyle/>
           <a:p>
             <a:r>
@@ -8888,17 +8917,24 @@
             <a:spLocks noGrp="1"/>
           </p:cNvSpPr>
           <p:nvPr>
-            <p:ph type="body" idx="1"/>
-          </p:nvPr>
-        </p:nvSpPr>
-        <p:spPr/>
-        <p:txBody>
-          <a:bodyPr/>
+            <p:ph type="subTitle" idx="1"/>
+          </p:nvPr>
+        </p:nvSpPr>
+        <p:spPr>
+          <a:xfrm>
+            <a:off x="1371600" y="2914650"/>
+            <a:ext cx="6400800" cy="1314450"/>
+          </a:xfrm>
+        </p:spPr>
+        <p:txBody>
+          <a:bodyPr wrap="square" anchor="t">
+            <a:normAutofit/>
+          </a:bodyPr>
           <a:lstStyle/>
           <a:p>
             <a:r>
               <a:rPr lang="en-US" dirty="0"/>
-              <a:t>Leverage XAML, C#, and Your Favorite IDE</a:t>
+              <a:t>Leverage XAML, C#, and your favorite IDE</a:t>
             </a:r>
           </a:p>
         </p:txBody>
@@ -8980,7 +9016,7 @@
         <p:spPr>
           <a:xfrm>
             <a:off x="457200" y="1106314"/>
-            <a:ext cx="4038600" cy="2545556"/>
+            <a:ext cx="4038600" cy="2905596"/>
           </a:xfrm>
         </p:spPr>
         <p:txBody>
@@ -8988,24 +9024,21 @@
           <a:lstStyle/>
           <a:p>
             <a:r>
-              <a:rPr lang="en-US" dirty="0"/>
+              <a:rPr lang="en-US" sz="2400" dirty="0"/>
               <a:t>XAML markup for clear &amp; declarative UI design when building responsive UIs.</a:t>
             </a:r>
           </a:p>
           <a:p>
             <a:r>
-              <a:rPr lang="en-US" dirty="0"/>
+              <a:rPr lang="en-US" sz="2400" dirty="0"/>
               <a:t>Code behind in C#</a:t>
             </a:r>
           </a:p>
           <a:p>
             <a:r>
-              <a:rPr lang="en-US" dirty="0"/>
+              <a:rPr lang="en-US" sz="2400" dirty="0"/>
               <a:t>Separation of concerns with MVVM</a:t>
             </a:r>
-          </a:p>
-          <a:p>
-            <a:endParaRPr lang="en-US" dirty="0"/>
           </a:p>
         </p:txBody>
       </p:sp>
@@ -9036,20 +9069,59 @@
           <a:lstStyle/>
           <a:p>
             <a:r>
-              <a:rPr lang="en-US" dirty="0"/>
+              <a:rPr lang="en-US" sz="2400" dirty="0"/>
               <a:t>Create UI in code with C# Markup</a:t>
             </a:r>
           </a:p>
           <a:p>
             <a:r>
-              <a:rPr lang="en-US" dirty="0"/>
+              <a:rPr lang="en-US" sz="2400" dirty="0"/>
               <a:t>MVU pattern for robust apps</a:t>
             </a:r>
           </a:p>
           <a:p>
             <a:r>
-              <a:rPr lang="en-US" dirty="0"/>
+              <a:rPr lang="en-US" sz="2400" dirty="0"/>
               <a:t>No XAML learning curve</a:t>
+            </a:r>
+          </a:p>
+        </p:txBody>
+      </p:sp>
+      <p:sp>
+        <p:nvSpPr>
+          <p:cNvPr id="5" name="TextBox 4">
+            <a:extLst>
+              <a:ext uri="{FF2B5EF4-FFF2-40B4-BE49-F238E27FC236}">
+                <a16:creationId xmlns:a16="http://schemas.microsoft.com/office/drawing/2014/main" id="{292D282D-D94A-E098-3A0D-BD10A5374527}"/>
+              </a:ext>
+            </a:extLst>
+          </p:cNvPr>
+          <p:cNvSpPr txBox="1"/>
+          <p:nvPr/>
+        </p:nvSpPr>
+        <p:spPr>
+          <a:xfrm>
+            <a:off x="457200" y="4054995"/>
+            <a:ext cx="6842771" cy="461665"/>
+          </a:xfrm>
+          <a:prstGeom prst="rect">
+            <a:avLst/>
+          </a:prstGeom>
+          <a:noFill/>
+        </p:spPr>
+        <p:txBody>
+          <a:bodyPr wrap="none" rtlCol="0">
+            <a:spAutoFit/>
+          </a:bodyPr>
+          <a:lstStyle/>
+          <a:p>
+            <a:pPr marL="342900" indent="-342900">
+              <a:buFont typeface="Arial" panose="020B0604020202020204" pitchFamily="34" charset="0"/>
+              <a:buChar char="•"/>
+            </a:pPr>
+            <a:r>
+              <a:rPr lang="en-US" sz="2400" dirty="0"/>
+              <a:t>Demo: Build apps in Visual Studio or VS Code</a:t>
             </a:r>
           </a:p>
         </p:txBody>
@@ -9260,7 +9332,7 @@
           <a:p>
             <a:r>
               <a:rPr lang="en-US" sz="2000" dirty="0"/>
-              <a:t>Demo - Toolkit docs on Microsoft Learn</a:t>
+              <a:t>Demo - Toolkit docs on Microsoft Learn &amp; GitHub samples</a:t>
             </a:r>
           </a:p>
         </p:txBody>

</xml_diff>

<commit_message>
Small slide updates for maui
</commit_message>
<xml_diff>
--- a/2025/1116_VSLiveOrlando/Maui Toolkit/Create Multi-Platform Apps with .NET.pptx
+++ b/2025/1116_VSLiveOrlando/Maui Toolkit/Create Multi-Platform Apps with .NET.pptx
@@ -6184,7 +6184,219 @@
             </a:pPr>
             <a:r>
               <a:rPr lang="en-US" dirty="0"/>
-              <a:t>We will cover an introduction to .NET MAUI, development tools, rapid app building techniques, enhancing apps with the MAUI Community Toolkit, architectural patterns like MVVM, styling options, platform-specific features, and conclude with a Q&amp;A session.</a:t>
+              <a:t>We will cover:</a:t>
+            </a:r>
+          </a:p>
+          <a:p>
+            <a:pPr marL="0" marR="0" lvl="0" indent="0" algn="l" defTabSz="914400" rtl="0" eaLnBrk="1" fontAlgn="base" latinLnBrk="0" hangingPunct="1">
+              <a:lnSpc>
+                <a:spcPct val="100000"/>
+              </a:lnSpc>
+              <a:spcBef>
+                <a:spcPct val="30000"/>
+              </a:spcBef>
+              <a:spcAft>
+                <a:spcPct val="0"/>
+              </a:spcAft>
+              <a:buClrTx/>
+              <a:buSzTx/>
+              <a:buFontTx/>
+              <a:buNone/>
+              <a:tabLst/>
+              <a:defRPr/>
+            </a:pPr>
+            <a:endParaRPr lang="en-US" dirty="0"/>
+          </a:p>
+          <a:p>
+            <a:pPr marL="171450" marR="0" lvl="0" indent="-171450" algn="l" defTabSz="914400" rtl="0" eaLnBrk="1" fontAlgn="base" latinLnBrk="0" hangingPunct="1">
+              <a:lnSpc>
+                <a:spcPct val="100000"/>
+              </a:lnSpc>
+              <a:spcBef>
+                <a:spcPct val="30000"/>
+              </a:spcBef>
+              <a:spcAft>
+                <a:spcPct val="0"/>
+              </a:spcAft>
+              <a:buClrTx/>
+              <a:buSzTx/>
+              <a:buFont typeface="Arial" panose="020B0604020202020204" pitchFamily="34" charset="0"/>
+              <a:buChar char="•"/>
+              <a:tabLst/>
+              <a:defRPr/>
+            </a:pPr>
+            <a:r>
+              <a:rPr lang="en-US" dirty="0"/>
+              <a:t>A quick introduction to .NET MAUI</a:t>
+            </a:r>
+          </a:p>
+          <a:p>
+            <a:pPr marL="171450" marR="0" lvl="0" indent="-171450" algn="l" defTabSz="914400" rtl="0" eaLnBrk="1" fontAlgn="base" latinLnBrk="0" hangingPunct="1">
+              <a:lnSpc>
+                <a:spcPct val="100000"/>
+              </a:lnSpc>
+              <a:spcBef>
+                <a:spcPct val="30000"/>
+              </a:spcBef>
+              <a:spcAft>
+                <a:spcPct val="0"/>
+              </a:spcAft>
+              <a:buClrTx/>
+              <a:buSzTx/>
+              <a:buFont typeface="Arial" panose="020B0604020202020204" pitchFamily="34" charset="0"/>
+              <a:buChar char="•"/>
+              <a:tabLst/>
+              <a:defRPr/>
+            </a:pPr>
+            <a:r>
+              <a:rPr lang="en-US" dirty="0"/>
+              <a:t>Development tools</a:t>
+            </a:r>
+          </a:p>
+          <a:p>
+            <a:pPr marL="171450" marR="0" lvl="0" indent="-171450" algn="l" defTabSz="914400" rtl="0" eaLnBrk="1" fontAlgn="base" latinLnBrk="0" hangingPunct="1">
+              <a:lnSpc>
+                <a:spcPct val="100000"/>
+              </a:lnSpc>
+              <a:spcBef>
+                <a:spcPct val="30000"/>
+              </a:spcBef>
+              <a:spcAft>
+                <a:spcPct val="0"/>
+              </a:spcAft>
+              <a:buClrTx/>
+              <a:buSzTx/>
+              <a:buFont typeface="Arial" panose="020B0604020202020204" pitchFamily="34" charset="0"/>
+              <a:buChar char="•"/>
+              <a:tabLst/>
+              <a:defRPr/>
+            </a:pPr>
+            <a:r>
+              <a:rPr lang="en-US" dirty="0"/>
+              <a:t>Rapid app building techniques and resources</a:t>
+            </a:r>
+          </a:p>
+          <a:p>
+            <a:pPr marL="171450" marR="0" lvl="0" indent="-171450" algn="l" defTabSz="914400" rtl="0" eaLnBrk="1" fontAlgn="base" latinLnBrk="0" hangingPunct="1">
+              <a:lnSpc>
+                <a:spcPct val="100000"/>
+              </a:lnSpc>
+              <a:spcBef>
+                <a:spcPct val="30000"/>
+              </a:spcBef>
+              <a:spcAft>
+                <a:spcPct val="0"/>
+              </a:spcAft>
+              <a:buClrTx/>
+              <a:buSzTx/>
+              <a:buFont typeface="Arial" panose="020B0604020202020204" pitchFamily="34" charset="0"/>
+              <a:buChar char="•"/>
+              <a:tabLst/>
+              <a:defRPr/>
+            </a:pPr>
+            <a:r>
+              <a:rPr lang="en-US" dirty="0"/>
+              <a:t>Enhancing apps with the MAUI Community Toolkit</a:t>
+            </a:r>
+          </a:p>
+          <a:p>
+            <a:pPr marL="171450" marR="0" lvl="0" indent="-171450" algn="l" defTabSz="914400" rtl="0" eaLnBrk="1" fontAlgn="base" latinLnBrk="0" hangingPunct="1">
+              <a:lnSpc>
+                <a:spcPct val="100000"/>
+              </a:lnSpc>
+              <a:spcBef>
+                <a:spcPct val="30000"/>
+              </a:spcBef>
+              <a:spcAft>
+                <a:spcPct val="0"/>
+              </a:spcAft>
+              <a:buClrTx/>
+              <a:buSzTx/>
+              <a:buFont typeface="Arial" panose="020B0604020202020204" pitchFamily="34" charset="0"/>
+              <a:buChar char="•"/>
+              <a:tabLst/>
+              <a:defRPr/>
+            </a:pPr>
+            <a:r>
+              <a:rPr lang="en-US" dirty="0"/>
+              <a:t>Using model-view-</a:t>
+            </a:r>
+            <a:r>
+              <a:rPr lang="en-US" dirty="0" err="1"/>
+              <a:t>viewmodel</a:t>
+            </a:r>
+            <a:r>
+              <a:rPr lang="en-US" dirty="0"/>
+              <a:t> and the MVVM Toolkit</a:t>
+            </a:r>
+          </a:p>
+          <a:p>
+            <a:pPr marL="171450" marR="0" lvl="0" indent="-171450" algn="l" defTabSz="914400" rtl="0" eaLnBrk="1" fontAlgn="base" latinLnBrk="0" hangingPunct="1">
+              <a:lnSpc>
+                <a:spcPct val="100000"/>
+              </a:lnSpc>
+              <a:spcBef>
+                <a:spcPct val="30000"/>
+              </a:spcBef>
+              <a:spcAft>
+                <a:spcPct val="0"/>
+              </a:spcAft>
+              <a:buClrTx/>
+              <a:buSzTx/>
+              <a:buFont typeface="Arial" panose="020B0604020202020204" pitchFamily="34" charset="0"/>
+              <a:buChar char="•"/>
+              <a:tabLst/>
+              <a:defRPr/>
+            </a:pPr>
+            <a:r>
+              <a:rPr lang="en-US" dirty="0"/>
+              <a:t>Styling options</a:t>
+            </a:r>
+          </a:p>
+          <a:p>
+            <a:pPr marL="171450" marR="0" lvl="0" indent="-171450" algn="l" defTabSz="914400" rtl="0" eaLnBrk="1" fontAlgn="base" latinLnBrk="0" hangingPunct="1">
+              <a:lnSpc>
+                <a:spcPct val="100000"/>
+              </a:lnSpc>
+              <a:spcBef>
+                <a:spcPct val="30000"/>
+              </a:spcBef>
+              <a:spcAft>
+                <a:spcPct val="0"/>
+              </a:spcAft>
+              <a:buClrTx/>
+              <a:buSzTx/>
+              <a:buFont typeface="Arial" panose="020B0604020202020204" pitchFamily="34" charset="0"/>
+              <a:buChar char="•"/>
+              <a:tabLst/>
+              <a:defRPr/>
+            </a:pPr>
+            <a:r>
+              <a:rPr lang="en-US" dirty="0"/>
+              <a:t>Platform and device-specific features</a:t>
+            </a:r>
+          </a:p>
+          <a:p>
+            <a:pPr marL="171450" marR="0" lvl="0" indent="-171450" algn="l" defTabSz="914400" rtl="0" eaLnBrk="1" fontAlgn="base" latinLnBrk="0" hangingPunct="1">
+              <a:lnSpc>
+                <a:spcPct val="100000"/>
+              </a:lnSpc>
+              <a:spcBef>
+                <a:spcPct val="30000"/>
+              </a:spcBef>
+              <a:spcAft>
+                <a:spcPct val="0"/>
+              </a:spcAft>
+              <a:buClrTx/>
+              <a:buSzTx/>
+              <a:buFont typeface="Arial" panose="020B0604020202020204" pitchFamily="34" charset="0"/>
+              <a:buChar char="•"/>
+              <a:tabLst/>
+              <a:defRPr/>
+            </a:pPr>
+            <a:r>
+              <a:rPr lang="en-US" dirty="0"/>
+              <a:t>Conclude with a Q&amp;A session</a:t>
             </a:r>
           </a:p>
         </p:txBody>

</xml_diff>

<commit_message>
Late updates in orlando
</commit_message>
<xml_diff>
--- a/2025/1116_VSLiveOrlando/Maui Toolkit/Create Multi-Platform Apps with .NET.pptx
+++ b/2025/1116_VSLiveOrlando/Maui Toolkit/Create Multi-Platform Apps with .NET.pptx
@@ -430,7 +430,7 @@
               <a:pPr>
                 <a:defRPr/>
               </a:pPr>
-              <a:t>11/19/2025</a:t>
+              <a:t>11/20/2025</a:t>
             </a:fld>
             <a:endParaRPr lang="en-US"/>
           </a:p>
@@ -1498,7 +1498,7 @@
                 <a:ea typeface="ＭＳ Ｐゴシック" pitchFamily="-72" charset="-128"/>
                 <a:cs typeface="ＭＳ Ｐゴシック" pitchFamily="-72" charset="-128"/>
               </a:rPr>
-              <a:t>On this slide, we’re looking at two ways to define UI in .NET MAUI: </a:t>
+              <a:t>Here we’re looking at two ways to define UI in .NET MAUI: </a:t>
             </a:r>
             <a:r>
               <a:rPr lang="en-US" sz="1200" b="1" i="0" kern="1200" dirty="0">
@@ -1972,7 +1972,7 @@
                 <a:ea typeface="ＭＳ Ｐゴシック" pitchFamily="-72" charset="-128"/>
                 <a:cs typeface="ＭＳ Ｐゴシック" pitchFamily="-72" charset="-128"/>
               </a:rPr>
-              <a:t> provides fluent helpers to build UI in code—useful when UI is highly dynamic or generated from data.</a:t>
+              <a:t> provides fluent helpers to build UI in code. This is useful when UI is highly dynamic or generated from data.</a:t>
             </a:r>
           </a:p>
           <a:p>
@@ -2505,7 +2505,7 @@
                 <a:ea typeface="ＭＳ Ｐゴシック" pitchFamily="-72" charset="-128"/>
                 <a:cs typeface="ＭＳ Ｐゴシック" pitchFamily="-72" charset="-128"/>
               </a:rPr>
-              <a:t>Let’s look at a couple of demos with some simple projects in Visual Studio and VS Code. (Not C# markup yet.)</a:t>
+              <a:t>Let’s look at a couple of demos to see what you get out of the box with MAUI templates in Visual Studio. (Not C# markup yet.)</a:t>
             </a:r>
           </a:p>
         </p:txBody>
@@ -6489,7 +6489,55 @@
           <a:p>
             <a:pPr fontAlgn="t"/>
             <a:r>
-              <a:rPr lang="en-US" sz="1200" b="0" i="0" kern="1200" dirty="0">
+              <a:rPr lang="en-US" sz="1800" b="0" i="0" kern="1200" dirty="0">
+                <a:solidFill>
+                  <a:schemeClr val="tx1"/>
+                </a:solidFill>
+                <a:effectLst/>
+                <a:latin typeface="+mn-lt"/>
+                <a:ea typeface="ＭＳ Ｐゴシック" pitchFamily="-72" charset="-128"/>
+                <a:cs typeface="ＭＳ Ｐゴシック" pitchFamily="-72" charset="-128"/>
+              </a:rPr>
+              <a:t>Before diving into the intro material, how many of you are at least somewhat familiar with MAUI? Maybe you’ve created and run a basic </a:t>
+            </a:r>
+            <a:r>
+              <a:rPr lang="en-US" sz="1800" b="0" i="0" kern="1200">
+                <a:solidFill>
+                  <a:schemeClr val="tx1"/>
+                </a:solidFill>
+                <a:effectLst/>
+                <a:latin typeface="+mn-lt"/>
+                <a:ea typeface="ＭＳ Ｐゴシック" pitchFamily="-72" charset="-128"/>
+                <a:cs typeface="ＭＳ Ｐゴシック" pitchFamily="-72" charset="-128"/>
+              </a:rPr>
+              <a:t>Hello World app?</a:t>
+            </a:r>
+            <a:endParaRPr lang="en-US" sz="1800" b="0" i="0" kern="1200" dirty="0">
+              <a:solidFill>
+                <a:schemeClr val="tx1"/>
+              </a:solidFill>
+              <a:effectLst/>
+              <a:latin typeface="+mn-lt"/>
+              <a:ea typeface="ＭＳ Ｐゴシック" pitchFamily="-72" charset="-128"/>
+              <a:cs typeface="ＭＳ Ｐゴシック" pitchFamily="-72" charset="-128"/>
+            </a:endParaRPr>
+          </a:p>
+          <a:p>
+            <a:pPr fontAlgn="t"/>
+            <a:endParaRPr lang="en-US" sz="1800" b="0" i="0" kern="1200" dirty="0">
+              <a:solidFill>
+                <a:schemeClr val="tx1"/>
+              </a:solidFill>
+              <a:effectLst/>
+              <a:latin typeface="+mn-lt"/>
+              <a:ea typeface="ＭＳ Ｐゴシック" pitchFamily="-72" charset="-128"/>
+              <a:cs typeface="ＭＳ Ｐゴシック" pitchFamily="-72" charset="-128"/>
+            </a:endParaRPr>
+          </a:p>
+          <a:p>
+            <a:pPr fontAlgn="t"/>
+            <a:r>
+              <a:rPr lang="en-US" sz="1800" b="0" i="0" kern="1200" dirty="0">
                 <a:solidFill>
                   <a:schemeClr val="tx1"/>
                 </a:solidFill>
@@ -6501,7 +6549,7 @@
               <a:t>.NET MAUI stands for </a:t>
             </a:r>
             <a:r>
-              <a:rPr lang="en-US" sz="1200" b="0" i="1" kern="1200" dirty="0">
+              <a:rPr lang="en-US" sz="1800" b="0" i="1" kern="1200" dirty="0">
                 <a:solidFill>
                   <a:schemeClr val="tx1"/>
                 </a:solidFill>
@@ -6513,7 +6561,7 @@
               <a:t>Multi‑platform App UI</a:t>
             </a:r>
             <a:r>
-              <a:rPr lang="en-US" sz="1200" b="0" i="0" kern="1200" dirty="0">
+              <a:rPr lang="en-US" sz="1800" b="0" i="0" kern="1200" dirty="0">
                 <a:solidFill>
                   <a:schemeClr val="tx1"/>
                 </a:solidFill>
@@ -6525,7 +6573,7 @@
               <a:t>. It’s the evolution of </a:t>
             </a:r>
             <a:r>
-              <a:rPr lang="en-US" sz="1200" b="0" i="0" kern="1200" dirty="0" err="1">
+              <a:rPr lang="en-US" sz="1800" b="0" i="0" kern="1200" dirty="0" err="1">
                 <a:solidFill>
                   <a:schemeClr val="tx1"/>
                 </a:solidFill>
@@ -6537,21 +6585,21 @@
               <a:t>Xamarin.Forms</a:t>
             </a:r>
             <a:r>
-              <a:rPr lang="en-US" sz="1200" b="0" i="0" kern="1200" dirty="0">
-                <a:solidFill>
-                  <a:schemeClr val="tx1"/>
-                </a:solidFill>
-                <a:effectLst/>
-                <a:latin typeface="+mn-lt"/>
-                <a:ea typeface="ＭＳ Ｐゴシック" pitchFamily="-72" charset="-128"/>
-                <a:cs typeface="ＭＳ Ｐゴシック" pitchFamily="-72" charset="-128"/>
-              </a:rPr>
-              <a:t> with a modern project structure and better performance, designed for .NET developers who want to ship on desktop and mobile from a shared codebase.</a:t>
+              <a:rPr lang="en-US" sz="1800" b="0" i="0" kern="1200" dirty="0">
+                <a:solidFill>
+                  <a:schemeClr val="tx1"/>
+                </a:solidFill>
+                <a:effectLst/>
+                <a:latin typeface="+mn-lt"/>
+                <a:ea typeface="ＭＳ Ｐゴシック" pitchFamily="-72" charset="-128"/>
+                <a:cs typeface="ＭＳ Ｐゴシック" pitchFamily="-72" charset="-128"/>
+              </a:rPr>
+              <a:t> with a modern project structure and better performance. It was created for .NET developers who want to ship on desktop and mobile from a shared codebase.</a:t>
             </a:r>
           </a:p>
           <a:p>
             <a:pPr fontAlgn="t"/>
-            <a:endParaRPr lang="en-US" sz="1200" b="0" i="0" kern="1200" dirty="0">
+            <a:endParaRPr lang="en-US" sz="1800" b="0" i="0" kern="1200" dirty="0">
               <a:solidFill>
                 <a:schemeClr val="tx1"/>
               </a:solidFill>
@@ -6580,7 +6628,7 @@
               <a:defRPr/>
             </a:pPr>
             <a:r>
-              <a:rPr lang="en-US" sz="1200" b="0" i="0" kern="1200" dirty="0">
+              <a:rPr lang="en-US" sz="1800" b="0" i="0" kern="1200" dirty="0">
                 <a:solidFill>
                   <a:schemeClr val="tx1"/>
                 </a:solidFill>
@@ -6610,7 +6658,7 @@
               <a:tabLst/>
               <a:defRPr/>
             </a:pPr>
-            <a:endParaRPr lang="en-US" sz="1200" b="0" i="0" kern="1200" dirty="0">
+            <a:endParaRPr lang="en-US" sz="1800" b="0" i="0" kern="1200" dirty="0">
               <a:solidFill>
                 <a:schemeClr val="tx1"/>
               </a:solidFill>
@@ -6638,7 +6686,7 @@
               <a:tabLst/>
               <a:defRPr/>
             </a:pPr>
-            <a:endParaRPr lang="en-US" sz="1200" b="0" i="0" kern="1200" dirty="0">
+            <a:endParaRPr lang="en-US" sz="1800" b="0" i="0" kern="1200" baseline="0" dirty="0">
               <a:solidFill>
                 <a:schemeClr val="tx1"/>
               </a:solidFill>
@@ -7188,7 +7236,7 @@
                 <a:ea typeface="ＭＳ Ｐゴシック" pitchFamily="-72" charset="-128"/>
                 <a:cs typeface="ＭＳ Ｐゴシック" pitchFamily="-72" charset="-128"/>
               </a:rPr>
-              <a:t>This slide compares .NET MAUI to other cross‑platform options. The core idea is: with MAUI you get a single .NET codebase that targets </a:t>
+              <a:t>This slide compares .NET MAUI to other cross‑platform options. The core idea is with MAUI you get a single .NET codebase that targets </a:t>
             </a:r>
             <a:r>
               <a:rPr lang="en-US" sz="1200" b="1" i="0" kern="1200" dirty="0">
@@ -8685,7 +8733,7 @@
                 <a:ea typeface="ＭＳ Ｐゴシック" pitchFamily="-72" charset="-128"/>
                 <a:cs typeface="ＭＳ Ｐゴシック" pitchFamily="-72" charset="-128"/>
               </a:rPr>
-              <a:t>Run on Android emulators and iOS simulators to catch platform‑specific layout or behavior issues early. For macOS/iOS debugging from Windows, you can </a:t>
+              <a:t>Run and debug apps on Android emulators and iOS simulators to catch platform‑specific layout or behavior issues early. For macOS/iOS debugging from Windows, you can </a:t>
             </a:r>
             <a:r>
               <a:rPr lang="en-US" sz="1200" b="1" i="0" kern="1200" dirty="0">
@@ -9063,7 +9111,7 @@
               <a:pPr>
                 <a:defRPr/>
               </a:pPr>
-              <a:t>11/19/2025</a:t>
+              <a:t>11/20/2025</a:t>
             </a:fld>
             <a:endParaRPr lang="en-US"/>
           </a:p>
@@ -9220,7 +9268,7 @@
               <a:pPr>
                 <a:defRPr/>
               </a:pPr>
-              <a:t>11/19/2025</a:t>
+              <a:t>11/20/2025</a:t>
             </a:fld>
             <a:endParaRPr lang="en-US"/>
           </a:p>
@@ -9387,7 +9435,7 @@
               <a:pPr>
                 <a:defRPr/>
               </a:pPr>
-              <a:t>11/19/2025</a:t>
+              <a:t>11/20/2025</a:t>
             </a:fld>
             <a:endParaRPr lang="en-US"/>
           </a:p>
@@ -9617,7 +9665,7 @@
               <a:pPr>
                 <a:defRPr/>
               </a:pPr>
-              <a:t>11/19/2025</a:t>
+              <a:t>11/20/2025</a:t>
             </a:fld>
             <a:endParaRPr lang="en-US"/>
           </a:p>
@@ -9784,7 +9832,7 @@
               <a:pPr>
                 <a:defRPr/>
               </a:pPr>
-              <a:t>11/19/2025</a:t>
+              <a:t>11/20/2025</a:t>
             </a:fld>
             <a:endParaRPr lang="en-US" dirty="0"/>
           </a:p>
@@ -10018,7 +10066,7 @@
               <a:pPr>
                 <a:defRPr/>
               </a:pPr>
-              <a:t>11/19/2025</a:t>
+              <a:t>11/20/2025</a:t>
             </a:fld>
             <a:endParaRPr lang="en-US"/>
           </a:p>
@@ -10292,7 +10340,7 @@
               <a:pPr>
                 <a:defRPr/>
               </a:pPr>
-              <a:t>11/19/2025</a:t>
+              <a:t>11/20/2025</a:t>
             </a:fld>
             <a:endParaRPr lang="en-US"/>
           </a:p>
@@ -10705,7 +10753,7 @@
               <a:pPr>
                 <a:defRPr/>
               </a:pPr>
-              <a:t>11/19/2025</a:t>
+              <a:t>11/20/2025</a:t>
             </a:fld>
             <a:endParaRPr lang="en-US"/>
           </a:p>
@@ -10811,7 +10859,7 @@
               <a:pPr>
                 <a:defRPr/>
               </a:pPr>
-              <a:t>11/19/2025</a:t>
+              <a:t>11/20/2025</a:t>
             </a:fld>
             <a:endParaRPr lang="en-US"/>
           </a:p>
@@ -10895,7 +10943,7 @@
               <a:pPr>
                 <a:defRPr/>
               </a:pPr>
-              <a:t>11/19/2025</a:t>
+              <a:t>11/20/2025</a:t>
             </a:fld>
             <a:endParaRPr lang="en-US"/>
           </a:p>
@@ -11159,7 +11207,7 @@
               <a:pPr>
                 <a:defRPr/>
               </a:pPr>
-              <a:t>11/19/2025</a:t>
+              <a:t>11/20/2025</a:t>
             </a:fld>
             <a:endParaRPr lang="en-US"/>
           </a:p>
@@ -11324,7 +11372,7 @@
               <a:pPr>
                 <a:defRPr/>
               </a:pPr>
-              <a:t>11/19/2025</a:t>
+              <a:t>11/20/2025</a:t>
             </a:fld>
             <a:endParaRPr lang="en-US" dirty="0"/>
           </a:p>
@@ -11571,7 +11619,7 @@
               <a:pPr>
                 <a:defRPr/>
               </a:pPr>
-              <a:t>11/19/2025</a:t>
+              <a:t>11/20/2025</a:t>
             </a:fld>
             <a:endParaRPr lang="en-US"/>
           </a:p>
@@ -11728,7 +11776,7 @@
               <a:pPr>
                 <a:defRPr/>
               </a:pPr>
-              <a:t>11/19/2025</a:t>
+              <a:t>11/20/2025</a:t>
             </a:fld>
             <a:endParaRPr lang="en-US"/>
           </a:p>
@@ -11895,7 +11943,7 @@
               <a:pPr>
                 <a:defRPr/>
               </a:pPr>
-              <a:t>11/19/2025</a:t>
+              <a:t>11/20/2025</a:t>
             </a:fld>
             <a:endParaRPr lang="en-US"/>
           </a:p>
@@ -12129,7 +12177,7 @@
               <a:pPr>
                 <a:defRPr/>
               </a:pPr>
-              <a:t>11/19/2025</a:t>
+              <a:t>11/20/2025</a:t>
             </a:fld>
             <a:endParaRPr lang="en-US"/>
           </a:p>
@@ -12403,7 +12451,7 @@
               <a:pPr>
                 <a:defRPr/>
               </a:pPr>
-              <a:t>11/19/2025</a:t>
+              <a:t>11/20/2025</a:t>
             </a:fld>
             <a:endParaRPr lang="en-US"/>
           </a:p>
@@ -12816,7 +12864,7 @@
               <a:pPr>
                 <a:defRPr/>
               </a:pPr>
-              <a:t>11/19/2025</a:t>
+              <a:t>11/20/2025</a:t>
             </a:fld>
             <a:endParaRPr lang="en-US"/>
           </a:p>
@@ -12922,7 +12970,7 @@
               <a:pPr>
                 <a:defRPr/>
               </a:pPr>
-              <a:t>11/19/2025</a:t>
+              <a:t>11/20/2025</a:t>
             </a:fld>
             <a:endParaRPr lang="en-US"/>
           </a:p>
@@ -13006,7 +13054,7 @@
               <a:pPr>
                 <a:defRPr/>
               </a:pPr>
-              <a:t>11/19/2025</a:t>
+              <a:t>11/20/2025</a:t>
             </a:fld>
             <a:endParaRPr lang="en-US"/>
           </a:p>
@@ -13270,7 +13318,7 @@
               <a:pPr>
                 <a:defRPr/>
               </a:pPr>
-              <a:t>11/19/2025</a:t>
+              <a:t>11/20/2025</a:t>
             </a:fld>
             <a:endParaRPr lang="en-US"/>
           </a:p>
@@ -13514,7 +13562,7 @@
               <a:pPr>
                 <a:defRPr/>
               </a:pPr>
-              <a:t>11/19/2025</a:t>
+              <a:t>11/20/2025</a:t>
             </a:fld>
             <a:endParaRPr lang="en-US"/>
           </a:p>
@@ -13747,7 +13795,7 @@
               <a:pPr>
                 <a:defRPr/>
               </a:pPr>
-              <a:t>11/19/2025</a:t>
+              <a:t>11/20/2025</a:t>
             </a:fld>
             <a:endParaRPr lang="en-US"/>
           </a:p>
@@ -14426,7 +14474,7 @@
               <a:pPr>
                 <a:defRPr/>
               </a:pPr>
-              <a:t>11/19/2025</a:t>
+              <a:t>11/20/2025</a:t>
             </a:fld>
             <a:endParaRPr lang="en-US"/>
           </a:p>
@@ -15395,7 +15443,7 @@
         <p:spPr>
           <a:xfrm>
             <a:off x="457200" y="4054995"/>
-            <a:ext cx="6842771" cy="461665"/>
+            <a:ext cx="5250989" cy="461665"/>
           </a:xfrm>
           <a:prstGeom prst="rect">
             <a:avLst/>
@@ -15414,7 +15462,7 @@
             </a:pPr>
             <a:r>
               <a:rPr lang="en-US" sz="2400" dirty="0"/>
-              <a:t>Demo: Build apps in Visual Studio or VS Code</a:t>
+              <a:t>Demo: Build apps in Visual Studio</a:t>
             </a:r>
           </a:p>
         </p:txBody>
@@ -15472,7 +15520,7 @@
           <a:p>
             <a:r>
               <a:rPr lang="en-US" dirty="0"/>
-              <a:t>MAUI Toolkit Overview</a:t>
+              <a:t>.NET MAUI Community Toolkit</a:t>
             </a:r>
           </a:p>
         </p:txBody>
@@ -17369,6 +17417,17 @@
             <a:r>
               <a:rPr lang="en-US" dirty="0"/>
               <a:t>Access Platform-Specific Features</a:t>
+            </a:r>
+          </a:p>
+          <a:p>
+            <a:pPr>
+              <a:lnSpc>
+                <a:spcPct val="100000"/>
+              </a:lnSpc>
+            </a:pPr>
+            <a:r>
+              <a:rPr lang="en-US" dirty="0"/>
+              <a:t>Using Foundry Local on Windows (Time Permitting)</a:t>
             </a:r>
           </a:p>
           <a:p>

</xml_diff>